<commit_message>
Added Burndown to Slides
</commit_message>
<xml_diff>
--- a/New folder/documentation/SLIDES/499 final pres/Cookie_Council_Final_Pres.pptx
+++ b/New folder/documentation/SLIDES/499 final pres/Cookie_Council_Final_Pres.pptx
@@ -5,7 +5,7 @@
     <p:sldMasterId id="2147483648" r:id="rId1"/>
   </p:sldMasterIdLst>
   <p:notesMasterIdLst>
-    <p:notesMasterId r:id="rId15"/>
+    <p:notesMasterId r:id="rId16"/>
   </p:notesMasterIdLst>
   <p:sldIdLst>
     <p:sldId id="256" r:id="rId2"/>
@@ -20,7 +20,8 @@
     <p:sldId id="268" r:id="rId11"/>
     <p:sldId id="266" r:id="rId12"/>
     <p:sldId id="267" r:id="rId13"/>
-    <p:sldId id="262" r:id="rId14"/>
+    <p:sldId id="270" r:id="rId14"/>
+    <p:sldId id="262" r:id="rId15"/>
   </p:sldIdLst>
   <p:sldSz cx="12192000" cy="6858000"/>
   <p:notesSz cx="6858000" cy="9144000"/>
@@ -136,6 +137,1157 @@
     </p:ext>
   </p:extLst>
 </p:presentation>
+</file>
+
+<file path=ppt/charts/chart1.xml><?xml version="1.0" encoding="utf-8"?>
+<c:chartSpace xmlns:c="http://schemas.openxmlformats.org/drawingml/2006/chart" xmlns:a="http://schemas.openxmlformats.org/drawingml/2006/main" xmlns:r="http://schemas.openxmlformats.org/officeDocument/2006/relationships">
+  <c:date1904 val="0"/>
+  <c:lang val="en-US"/>
+  <c:roundedCorners val="0"/>
+  <mc:AlternateContent xmlns:mc="http://schemas.openxmlformats.org/markup-compatibility/2006">
+    <mc:Choice xmlns:c14="http://schemas.microsoft.com/office/drawing/2007/8/2/chart" Requires="c14">
+      <c14:style val="102"/>
+    </mc:Choice>
+    <mc:Fallback>
+      <c:style val="2"/>
+    </mc:Fallback>
+  </mc:AlternateContent>
+  <c:chart>
+    <c:title>
+      <c:tx>
+        <c:rich>
+          <a:bodyPr rot="0" spcFirstLastPara="1" vertOverflow="ellipsis" vert="horz" wrap="square" anchor="ctr" anchorCtr="1"/>
+          <a:lstStyle/>
+          <a:p>
+            <a:pPr>
+              <a:defRPr sz="1400" b="0" i="0" u="none" strike="noStrike" kern="1200" spc="0" baseline="0">
+                <a:solidFill>
+                  <a:schemeClr val="tx1">
+                    <a:lumMod val="65000"/>
+                    <a:lumOff val="35000"/>
+                  </a:schemeClr>
+                </a:solidFill>
+                <a:latin typeface="+mn-lt"/>
+                <a:ea typeface="+mn-ea"/>
+                <a:cs typeface="+mn-cs"/>
+              </a:defRPr>
+            </a:pPr>
+            <a:r>
+              <a:rPr lang="en-US"/>
+              <a:t>Product</a:t>
+            </a:r>
+            <a:r>
+              <a:rPr lang="en-US" baseline="0"/>
+              <a:t> Burndown</a:t>
+            </a:r>
+          </a:p>
+        </c:rich>
+      </c:tx>
+      <c:layout/>
+      <c:overlay val="0"/>
+      <c:spPr>
+        <a:noFill/>
+        <a:ln>
+          <a:noFill/>
+        </a:ln>
+        <a:effectLst/>
+      </c:spPr>
+      <c:txPr>
+        <a:bodyPr rot="0" spcFirstLastPara="1" vertOverflow="ellipsis" vert="horz" wrap="square" anchor="ctr" anchorCtr="1"/>
+        <a:lstStyle/>
+        <a:p>
+          <a:pPr>
+            <a:defRPr sz="1400" b="0" i="0" u="none" strike="noStrike" kern="1200" spc="0" baseline="0">
+              <a:solidFill>
+                <a:schemeClr val="tx1">
+                  <a:lumMod val="65000"/>
+                  <a:lumOff val="35000"/>
+                </a:schemeClr>
+              </a:solidFill>
+              <a:latin typeface="+mn-lt"/>
+              <a:ea typeface="+mn-ea"/>
+              <a:cs typeface="+mn-cs"/>
+            </a:defRPr>
+          </a:pPr>
+          <a:endParaRPr lang="en-US"/>
+        </a:p>
+      </c:txPr>
+    </c:title>
+    <c:autoTitleDeleted val="0"/>
+    <c:plotArea>
+      <c:layout/>
+      <c:lineChart>
+        <c:grouping val="standard"/>
+        <c:varyColors val="0"/>
+        <c:ser>
+          <c:idx val="0"/>
+          <c:order val="0"/>
+          <c:tx>
+            <c:strRef>
+              <c:f>Product!$B$83</c:f>
+              <c:strCache>
+                <c:ptCount val="1"/>
+                <c:pt idx="0">
+                  <c:v>estimatedBurn</c:v>
+                </c:pt>
+              </c:strCache>
+            </c:strRef>
+          </c:tx>
+          <c:spPr>
+            <a:ln w="28575" cap="rnd">
+              <a:solidFill>
+                <a:schemeClr val="accent1"/>
+              </a:solidFill>
+              <a:prstDash val="sysDash"/>
+              <a:round/>
+            </a:ln>
+            <a:effectLst/>
+          </c:spPr>
+          <c:marker>
+            <c:symbol val="none"/>
+          </c:marker>
+          <c:val>
+            <c:numRef>
+              <c:f>Product!$C$83:$Y$83</c:f>
+              <c:numCache>
+                <c:formatCode>General</c:formatCode>
+                <c:ptCount val="23"/>
+                <c:pt idx="0">
+                  <c:v>554.78260869565213</c:v>
+                </c:pt>
+                <c:pt idx="1">
+                  <c:v>529.56521739130437</c:v>
+                </c:pt>
+                <c:pt idx="2">
+                  <c:v>504.3478260869565</c:v>
+                </c:pt>
+                <c:pt idx="3">
+                  <c:v>479.13043478260869</c:v>
+                </c:pt>
+                <c:pt idx="4">
+                  <c:v>453.91304347826087</c:v>
+                </c:pt>
+                <c:pt idx="5">
+                  <c:v>428.69565217391306</c:v>
+                </c:pt>
+                <c:pt idx="6">
+                  <c:v>403.47826086956525</c:v>
+                </c:pt>
+                <c:pt idx="7">
+                  <c:v>378.26086956521738</c:v>
+                </c:pt>
+                <c:pt idx="8">
+                  <c:v>353.04347826086962</c:v>
+                </c:pt>
+                <c:pt idx="9">
+                  <c:v>327.82608695652175</c:v>
+                </c:pt>
+                <c:pt idx="10">
+                  <c:v>302.60869565217394</c:v>
+                </c:pt>
+                <c:pt idx="11">
+                  <c:v>277.39130434782612</c:v>
+                </c:pt>
+                <c:pt idx="12">
+                  <c:v>252.17391304347831</c:v>
+                </c:pt>
+                <c:pt idx="13">
+                  <c:v>226.95652173913044</c:v>
+                </c:pt>
+                <c:pt idx="14">
+                  <c:v>201.73913043478262</c:v>
+                </c:pt>
+                <c:pt idx="15">
+                  <c:v>176.52173913043481</c:v>
+                </c:pt>
+                <c:pt idx="16">
+                  <c:v>151.304347826087</c:v>
+                </c:pt>
+                <c:pt idx="17">
+                  <c:v>126.08695652173918</c:v>
+                </c:pt>
+                <c:pt idx="18">
+                  <c:v>100.86956521739131</c:v>
+                </c:pt>
+                <c:pt idx="19">
+                  <c:v>75.652173913043498</c:v>
+                </c:pt>
+                <c:pt idx="20">
+                  <c:v>50.434782608695741</c:v>
+                </c:pt>
+                <c:pt idx="21">
+                  <c:v>25.217391304347871</c:v>
+                </c:pt>
+                <c:pt idx="22">
+                  <c:v>0</c:v>
+                </c:pt>
+              </c:numCache>
+            </c:numRef>
+          </c:val>
+          <c:smooth val="0"/>
+          <c:extLst xmlns:c16r2="http://schemas.microsoft.com/office/drawing/2015/06/chart">
+            <c:ext xmlns:c16="http://schemas.microsoft.com/office/drawing/2014/chart" uri="{C3380CC4-5D6E-409C-BE32-E72D297353CC}">
+              <c16:uniqueId val="{00000000-8152-4DC2-8CD6-94BB58FF6125}"/>
+            </c:ext>
+          </c:extLst>
+        </c:ser>
+        <c:ser>
+          <c:idx val="1"/>
+          <c:order val="1"/>
+          <c:tx>
+            <c:strRef>
+              <c:f>Product!$B$84</c:f>
+              <c:strCache>
+                <c:ptCount val="1"/>
+                <c:pt idx="0">
+                  <c:v>Burn</c:v>
+                </c:pt>
+              </c:strCache>
+            </c:strRef>
+          </c:tx>
+          <c:spPr>
+            <a:ln w="28575" cap="rnd">
+              <a:solidFill>
+                <a:schemeClr val="accent2"/>
+              </a:solidFill>
+              <a:round/>
+            </a:ln>
+            <a:effectLst/>
+          </c:spPr>
+          <c:marker>
+            <c:symbol val="none"/>
+          </c:marker>
+          <c:val>
+            <c:numRef>
+              <c:f>Product!$C$84:$W$84</c:f>
+              <c:numCache>
+                <c:formatCode>0.00</c:formatCode>
+                <c:ptCount val="21"/>
+                <c:pt idx="0">
+                  <c:v>562.75</c:v>
+                </c:pt>
+                <c:pt idx="1">
+                  <c:v>542.75</c:v>
+                </c:pt>
+                <c:pt idx="2">
+                  <c:v>518.25</c:v>
+                </c:pt>
+                <c:pt idx="3">
+                  <c:v>493.25</c:v>
+                </c:pt>
+                <c:pt idx="4">
+                  <c:v>484</c:v>
+                </c:pt>
+                <c:pt idx="5">
+                  <c:v>458</c:v>
+                </c:pt>
+                <c:pt idx="6">
+                  <c:v>423.5</c:v>
+                </c:pt>
+                <c:pt idx="7">
+                  <c:v>387.75</c:v>
+                </c:pt>
+                <c:pt idx="8">
+                  <c:v>345.75</c:v>
+                </c:pt>
+                <c:pt idx="9">
+                  <c:v>326.75</c:v>
+                </c:pt>
+                <c:pt idx="10">
+                  <c:v>310.75</c:v>
+                </c:pt>
+                <c:pt idx="11">
+                  <c:v>284.75</c:v>
+                </c:pt>
+                <c:pt idx="12">
+                  <c:v>247.75</c:v>
+                </c:pt>
+                <c:pt idx="13">
+                  <c:v>216.75</c:v>
+                </c:pt>
+                <c:pt idx="14">
+                  <c:v>176.75</c:v>
+                </c:pt>
+                <c:pt idx="15">
+                  <c:v>141.75</c:v>
+                </c:pt>
+                <c:pt idx="16">
+                  <c:v>111.75</c:v>
+                </c:pt>
+                <c:pt idx="17">
+                  <c:v>84.75</c:v>
+                </c:pt>
+                <c:pt idx="18">
+                  <c:v>34.75</c:v>
+                </c:pt>
+                <c:pt idx="19">
+                  <c:v>-9.25</c:v>
+                </c:pt>
+                <c:pt idx="20">
+                  <c:v>-55.25</c:v>
+                </c:pt>
+              </c:numCache>
+            </c:numRef>
+          </c:val>
+          <c:smooth val="0"/>
+          <c:extLst xmlns:c16r2="http://schemas.microsoft.com/office/drawing/2015/06/chart">
+            <c:ext xmlns:c16="http://schemas.microsoft.com/office/drawing/2014/chart" uri="{C3380CC4-5D6E-409C-BE32-E72D297353CC}">
+              <c16:uniqueId val="{00000001-8152-4DC2-8CD6-94BB58FF6125}"/>
+            </c:ext>
+          </c:extLst>
+        </c:ser>
+        <c:dLbls>
+          <c:showLegendKey val="0"/>
+          <c:showVal val="0"/>
+          <c:showCatName val="0"/>
+          <c:showSerName val="0"/>
+          <c:showPercent val="0"/>
+          <c:showBubbleSize val="0"/>
+        </c:dLbls>
+        <c:smooth val="0"/>
+        <c:axId val="210488784"/>
+        <c:axId val="66145568"/>
+      </c:lineChart>
+      <c:catAx>
+        <c:axId val="210488784"/>
+        <c:scaling>
+          <c:orientation val="minMax"/>
+        </c:scaling>
+        <c:delete val="0"/>
+        <c:axPos val="b"/>
+        <c:title>
+          <c:tx>
+            <c:rich>
+              <a:bodyPr rot="0" spcFirstLastPara="1" vertOverflow="ellipsis" vert="horz" wrap="square" anchor="ctr" anchorCtr="1"/>
+              <a:lstStyle/>
+              <a:p>
+                <a:pPr>
+                  <a:defRPr sz="1000" b="0" i="0" u="none" strike="noStrike" kern="1200" baseline="0">
+                    <a:solidFill>
+                      <a:schemeClr val="tx1">
+                        <a:lumMod val="65000"/>
+                        <a:lumOff val="35000"/>
+                      </a:schemeClr>
+                    </a:solidFill>
+                    <a:latin typeface="+mn-lt"/>
+                    <a:ea typeface="+mn-ea"/>
+                    <a:cs typeface="+mn-cs"/>
+                  </a:defRPr>
+                </a:pPr>
+                <a:r>
+                  <a:rPr lang="en-US"/>
+                  <a:t>Weeks</a:t>
+                </a:r>
+              </a:p>
+            </c:rich>
+          </c:tx>
+          <c:layout/>
+          <c:overlay val="0"/>
+          <c:spPr>
+            <a:noFill/>
+            <a:ln>
+              <a:noFill/>
+            </a:ln>
+            <a:effectLst/>
+          </c:spPr>
+          <c:txPr>
+            <a:bodyPr rot="0" spcFirstLastPara="1" vertOverflow="ellipsis" vert="horz" wrap="square" anchor="ctr" anchorCtr="1"/>
+            <a:lstStyle/>
+            <a:p>
+              <a:pPr>
+                <a:defRPr sz="1000" b="0" i="0" u="none" strike="noStrike" kern="1200" baseline="0">
+                  <a:solidFill>
+                    <a:schemeClr val="tx1">
+                      <a:lumMod val="65000"/>
+                      <a:lumOff val="35000"/>
+                    </a:schemeClr>
+                  </a:solidFill>
+                  <a:latin typeface="+mn-lt"/>
+                  <a:ea typeface="+mn-ea"/>
+                  <a:cs typeface="+mn-cs"/>
+                </a:defRPr>
+              </a:pPr>
+              <a:endParaRPr lang="en-US"/>
+            </a:p>
+          </c:txPr>
+        </c:title>
+        <c:numFmt formatCode="General" sourceLinked="1"/>
+        <c:majorTickMark val="none"/>
+        <c:minorTickMark val="none"/>
+        <c:tickLblPos val="nextTo"/>
+        <c:spPr>
+          <a:noFill/>
+          <a:ln w="9525" cap="flat" cmpd="sng" algn="ctr">
+            <a:solidFill>
+              <a:schemeClr val="tx1">
+                <a:lumMod val="15000"/>
+                <a:lumOff val="85000"/>
+              </a:schemeClr>
+            </a:solidFill>
+            <a:round/>
+          </a:ln>
+          <a:effectLst/>
+        </c:spPr>
+        <c:txPr>
+          <a:bodyPr rot="-60000000" spcFirstLastPara="1" vertOverflow="ellipsis" vert="horz" wrap="square" anchor="ctr" anchorCtr="1"/>
+          <a:lstStyle/>
+          <a:p>
+            <a:pPr>
+              <a:defRPr sz="900" b="0" i="0" u="none" strike="noStrike" kern="1200" baseline="0">
+                <a:solidFill>
+                  <a:schemeClr val="tx1">
+                    <a:lumMod val="65000"/>
+                    <a:lumOff val="35000"/>
+                  </a:schemeClr>
+                </a:solidFill>
+                <a:latin typeface="+mn-lt"/>
+                <a:ea typeface="+mn-ea"/>
+                <a:cs typeface="+mn-cs"/>
+              </a:defRPr>
+            </a:pPr>
+            <a:endParaRPr lang="en-US"/>
+          </a:p>
+        </c:txPr>
+        <c:crossAx val="66145568"/>
+        <c:crosses val="autoZero"/>
+        <c:auto val="1"/>
+        <c:lblAlgn val="ctr"/>
+        <c:lblOffset val="100"/>
+        <c:noMultiLvlLbl val="0"/>
+      </c:catAx>
+      <c:valAx>
+        <c:axId val="66145568"/>
+        <c:scaling>
+          <c:orientation val="minMax"/>
+        </c:scaling>
+        <c:delete val="0"/>
+        <c:axPos val="l"/>
+        <c:majorGridlines>
+          <c:spPr>
+            <a:ln w="9525" cap="flat" cmpd="sng" algn="ctr">
+              <a:solidFill>
+                <a:schemeClr val="tx1">
+                  <a:lumMod val="15000"/>
+                  <a:lumOff val="85000"/>
+                </a:schemeClr>
+              </a:solidFill>
+              <a:round/>
+            </a:ln>
+            <a:effectLst/>
+          </c:spPr>
+        </c:majorGridlines>
+        <c:title>
+          <c:tx>
+            <c:rich>
+              <a:bodyPr rot="-5400000" spcFirstLastPara="1" vertOverflow="ellipsis" vert="horz" wrap="square" anchor="ctr" anchorCtr="1"/>
+              <a:lstStyle/>
+              <a:p>
+                <a:pPr>
+                  <a:defRPr sz="1000" b="0" i="0" u="none" strike="noStrike" kern="1200" baseline="0">
+                    <a:solidFill>
+                      <a:schemeClr val="tx1">
+                        <a:lumMod val="65000"/>
+                        <a:lumOff val="35000"/>
+                      </a:schemeClr>
+                    </a:solidFill>
+                    <a:latin typeface="+mn-lt"/>
+                    <a:ea typeface="+mn-ea"/>
+                    <a:cs typeface="+mn-cs"/>
+                  </a:defRPr>
+                </a:pPr>
+                <a:r>
+                  <a:rPr lang="en-US"/>
+                  <a:t>HoursRemaining</a:t>
+                </a:r>
+              </a:p>
+            </c:rich>
+          </c:tx>
+          <c:layout/>
+          <c:overlay val="0"/>
+          <c:spPr>
+            <a:noFill/>
+            <a:ln>
+              <a:noFill/>
+            </a:ln>
+            <a:effectLst/>
+          </c:spPr>
+          <c:txPr>
+            <a:bodyPr rot="-5400000" spcFirstLastPara="1" vertOverflow="ellipsis" vert="horz" wrap="square" anchor="ctr" anchorCtr="1"/>
+            <a:lstStyle/>
+            <a:p>
+              <a:pPr>
+                <a:defRPr sz="1000" b="0" i="0" u="none" strike="noStrike" kern="1200" baseline="0">
+                  <a:solidFill>
+                    <a:schemeClr val="tx1">
+                      <a:lumMod val="65000"/>
+                      <a:lumOff val="35000"/>
+                    </a:schemeClr>
+                  </a:solidFill>
+                  <a:latin typeface="+mn-lt"/>
+                  <a:ea typeface="+mn-ea"/>
+                  <a:cs typeface="+mn-cs"/>
+                </a:defRPr>
+              </a:pPr>
+              <a:endParaRPr lang="en-US"/>
+            </a:p>
+          </c:txPr>
+        </c:title>
+        <c:numFmt formatCode="General" sourceLinked="1"/>
+        <c:majorTickMark val="none"/>
+        <c:minorTickMark val="none"/>
+        <c:tickLblPos val="nextTo"/>
+        <c:spPr>
+          <a:noFill/>
+          <a:ln>
+            <a:noFill/>
+          </a:ln>
+          <a:effectLst/>
+        </c:spPr>
+        <c:txPr>
+          <a:bodyPr rot="-60000000" spcFirstLastPara="1" vertOverflow="ellipsis" vert="horz" wrap="square" anchor="ctr" anchorCtr="1"/>
+          <a:lstStyle/>
+          <a:p>
+            <a:pPr>
+              <a:defRPr sz="900" b="0" i="0" u="none" strike="noStrike" kern="1200" baseline="0">
+                <a:solidFill>
+                  <a:schemeClr val="tx1">
+                    <a:lumMod val="65000"/>
+                    <a:lumOff val="35000"/>
+                  </a:schemeClr>
+                </a:solidFill>
+                <a:latin typeface="+mn-lt"/>
+                <a:ea typeface="+mn-ea"/>
+                <a:cs typeface="+mn-cs"/>
+              </a:defRPr>
+            </a:pPr>
+            <a:endParaRPr lang="en-US"/>
+          </a:p>
+        </c:txPr>
+        <c:crossAx val="210488784"/>
+        <c:crosses val="autoZero"/>
+        <c:crossBetween val="between"/>
+      </c:valAx>
+      <c:spPr>
+        <a:noFill/>
+        <a:ln>
+          <a:noFill/>
+        </a:ln>
+        <a:effectLst/>
+      </c:spPr>
+    </c:plotArea>
+    <c:legend>
+      <c:legendPos val="r"/>
+      <c:layout/>
+      <c:overlay val="0"/>
+      <c:spPr>
+        <a:noFill/>
+        <a:ln>
+          <a:noFill/>
+        </a:ln>
+        <a:effectLst/>
+      </c:spPr>
+      <c:txPr>
+        <a:bodyPr rot="0" spcFirstLastPara="1" vertOverflow="ellipsis" vert="horz" wrap="square" anchor="ctr" anchorCtr="1"/>
+        <a:lstStyle/>
+        <a:p>
+          <a:pPr>
+            <a:defRPr sz="900" b="0" i="0" u="none" strike="noStrike" kern="1200" baseline="0">
+              <a:solidFill>
+                <a:schemeClr val="tx1">
+                  <a:lumMod val="65000"/>
+                  <a:lumOff val="35000"/>
+                </a:schemeClr>
+              </a:solidFill>
+              <a:latin typeface="+mn-lt"/>
+              <a:ea typeface="+mn-ea"/>
+              <a:cs typeface="+mn-cs"/>
+            </a:defRPr>
+          </a:pPr>
+          <a:endParaRPr lang="en-US"/>
+        </a:p>
+      </c:txPr>
+    </c:legend>
+    <c:plotVisOnly val="1"/>
+    <c:dispBlanksAs val="gap"/>
+    <c:showDLblsOverMax val="0"/>
+  </c:chart>
+  <c:spPr>
+    <a:noFill/>
+    <a:ln>
+      <a:noFill/>
+    </a:ln>
+    <a:effectLst/>
+  </c:spPr>
+  <c:txPr>
+    <a:bodyPr/>
+    <a:lstStyle/>
+    <a:p>
+      <a:pPr>
+        <a:defRPr/>
+      </a:pPr>
+      <a:endParaRPr lang="en-US"/>
+    </a:p>
+  </c:txPr>
+  <c:externalData r:id="rId3">
+    <c:autoUpdate val="0"/>
+  </c:externalData>
+</c:chartSpace>
+</file>
+
+<file path=ppt/charts/colors1.xml><?xml version="1.0" encoding="utf-8"?>
+<cs:colorStyle xmlns:cs="http://schemas.microsoft.com/office/drawing/2012/chartStyle" xmlns:a="http://schemas.openxmlformats.org/drawingml/2006/main" meth="cycle" id="10">
+  <a:schemeClr val="accent1"/>
+  <a:schemeClr val="accent2"/>
+  <a:schemeClr val="accent3"/>
+  <a:schemeClr val="accent4"/>
+  <a:schemeClr val="accent5"/>
+  <a:schemeClr val="accent6"/>
+  <cs:variation/>
+  <cs:variation>
+    <a:lumMod val="60000"/>
+  </cs:variation>
+  <cs:variation>
+    <a:lumMod val="80000"/>
+    <a:lumOff val="20000"/>
+  </cs:variation>
+  <cs:variation>
+    <a:lumMod val="80000"/>
+  </cs:variation>
+  <cs:variation>
+    <a:lumMod val="60000"/>
+    <a:lumOff val="40000"/>
+  </cs:variation>
+  <cs:variation>
+    <a:lumMod val="50000"/>
+  </cs:variation>
+  <cs:variation>
+    <a:lumMod val="70000"/>
+    <a:lumOff val="30000"/>
+  </cs:variation>
+  <cs:variation>
+    <a:lumMod val="70000"/>
+  </cs:variation>
+  <cs:variation>
+    <a:lumMod val="50000"/>
+    <a:lumOff val="50000"/>
+  </cs:variation>
+</cs:colorStyle>
+</file>
+
+<file path=ppt/charts/style1.xml><?xml version="1.0" encoding="utf-8"?>
+<cs:chartStyle xmlns:cs="http://schemas.microsoft.com/office/drawing/2012/chartStyle" xmlns:a="http://schemas.openxmlformats.org/drawingml/2006/main" id="227">
+  <cs:axisTitle>
+    <cs:lnRef idx="0"/>
+    <cs:fillRef idx="0"/>
+    <cs:effectRef idx="0"/>
+    <cs:fontRef idx="minor">
+      <a:schemeClr val="tx1">
+        <a:lumMod val="65000"/>
+        <a:lumOff val="35000"/>
+      </a:schemeClr>
+    </cs:fontRef>
+    <cs:defRPr sz="1000" kern="1200"/>
+  </cs:axisTitle>
+  <cs:categoryAxis>
+    <cs:lnRef idx="0"/>
+    <cs:fillRef idx="0"/>
+    <cs:effectRef idx="0"/>
+    <cs:fontRef idx="minor">
+      <a:schemeClr val="tx1">
+        <a:lumMod val="65000"/>
+        <a:lumOff val="35000"/>
+      </a:schemeClr>
+    </cs:fontRef>
+    <cs:spPr>
+      <a:ln w="9525" cap="flat" cmpd="sng" algn="ctr">
+        <a:solidFill>
+          <a:schemeClr val="tx1">
+            <a:lumMod val="15000"/>
+            <a:lumOff val="85000"/>
+          </a:schemeClr>
+        </a:solidFill>
+        <a:round/>
+      </a:ln>
+    </cs:spPr>
+    <cs:defRPr sz="900" kern="1200"/>
+  </cs:categoryAxis>
+  <cs:chartArea mods="allowNoFillOverride allowNoLineOverride">
+    <cs:lnRef idx="0"/>
+    <cs:fillRef idx="0"/>
+    <cs:effectRef idx="0"/>
+    <cs:fontRef idx="minor">
+      <a:schemeClr val="tx1"/>
+    </cs:fontRef>
+    <cs:spPr>
+      <a:solidFill>
+        <a:schemeClr val="bg1"/>
+      </a:solidFill>
+      <a:ln w="9525" cap="flat" cmpd="sng" algn="ctr">
+        <a:solidFill>
+          <a:schemeClr val="tx1">
+            <a:lumMod val="15000"/>
+            <a:lumOff val="85000"/>
+          </a:schemeClr>
+        </a:solidFill>
+        <a:round/>
+      </a:ln>
+    </cs:spPr>
+    <cs:defRPr sz="1000" kern="1200"/>
+  </cs:chartArea>
+  <cs:dataLabel>
+    <cs:lnRef idx="0"/>
+    <cs:fillRef idx="0"/>
+    <cs:effectRef idx="0"/>
+    <cs:fontRef idx="minor">
+      <a:schemeClr val="tx1">
+        <a:lumMod val="75000"/>
+        <a:lumOff val="25000"/>
+      </a:schemeClr>
+    </cs:fontRef>
+    <cs:defRPr sz="900" kern="1200"/>
+  </cs:dataLabel>
+  <cs:dataLabelCallout>
+    <cs:lnRef idx="0"/>
+    <cs:fillRef idx="0"/>
+    <cs:effectRef idx="0"/>
+    <cs:fontRef idx="minor">
+      <a:schemeClr val="dk1">
+        <a:lumMod val="65000"/>
+        <a:lumOff val="35000"/>
+      </a:schemeClr>
+    </cs:fontRef>
+    <cs:spPr>
+      <a:solidFill>
+        <a:schemeClr val="lt1"/>
+      </a:solidFill>
+      <a:ln>
+        <a:solidFill>
+          <a:schemeClr val="dk1">
+            <a:lumMod val="25000"/>
+            <a:lumOff val="75000"/>
+          </a:schemeClr>
+        </a:solidFill>
+      </a:ln>
+    </cs:spPr>
+    <cs:defRPr sz="900" kern="1200"/>
+    <cs:bodyPr rot="0" spcFirstLastPara="1" vertOverflow="clip" horzOverflow="clip" vert="horz" wrap="square" lIns="36576" tIns="18288" rIns="36576" bIns="18288" anchor="ctr" anchorCtr="1">
+      <a:spAutoFit/>
+    </cs:bodyPr>
+  </cs:dataLabelCallout>
+  <cs:dataPoint>
+    <cs:lnRef idx="0"/>
+    <cs:fillRef idx="1">
+      <cs:styleClr val="auto"/>
+    </cs:fillRef>
+    <cs:effectRef idx="0"/>
+    <cs:fontRef idx="minor">
+      <a:schemeClr val="tx1"/>
+    </cs:fontRef>
+    <cs:spPr>
+      <a:solidFill>
+        <a:schemeClr val="phClr"/>
+      </a:solidFill>
+    </cs:spPr>
+  </cs:dataPoint>
+  <cs:dataPoint3D>
+    <cs:lnRef idx="0"/>
+    <cs:fillRef idx="1">
+      <cs:styleClr val="auto"/>
+    </cs:fillRef>
+    <cs:effectRef idx="0"/>
+    <cs:fontRef idx="minor">
+      <a:schemeClr val="tx1"/>
+    </cs:fontRef>
+    <cs:spPr>
+      <a:solidFill>
+        <a:schemeClr val="phClr"/>
+      </a:solidFill>
+    </cs:spPr>
+  </cs:dataPoint3D>
+  <cs:dataPointLine>
+    <cs:lnRef idx="0">
+      <cs:styleClr val="auto"/>
+    </cs:lnRef>
+    <cs:fillRef idx="1"/>
+    <cs:effectRef idx="0"/>
+    <cs:fontRef idx="minor">
+      <a:schemeClr val="tx1"/>
+    </cs:fontRef>
+    <cs:spPr>
+      <a:ln w="28575" cap="rnd">
+        <a:solidFill>
+          <a:schemeClr val="phClr"/>
+        </a:solidFill>
+        <a:round/>
+      </a:ln>
+    </cs:spPr>
+  </cs:dataPointLine>
+  <cs:dataPointMarker>
+    <cs:lnRef idx="0">
+      <cs:styleClr val="auto"/>
+    </cs:lnRef>
+    <cs:fillRef idx="1">
+      <cs:styleClr val="auto"/>
+    </cs:fillRef>
+    <cs:effectRef idx="0"/>
+    <cs:fontRef idx="minor">
+      <a:schemeClr val="tx1"/>
+    </cs:fontRef>
+    <cs:spPr>
+      <a:solidFill>
+        <a:schemeClr val="phClr"/>
+      </a:solidFill>
+      <a:ln w="9525">
+        <a:solidFill>
+          <a:schemeClr val="phClr"/>
+        </a:solidFill>
+      </a:ln>
+    </cs:spPr>
+  </cs:dataPointMarker>
+  <cs:dataPointMarkerLayout symbol="circle" size="5"/>
+  <cs:dataPointWireframe>
+    <cs:lnRef idx="0">
+      <cs:styleClr val="auto"/>
+    </cs:lnRef>
+    <cs:fillRef idx="1"/>
+    <cs:effectRef idx="0"/>
+    <cs:fontRef idx="minor">
+      <a:schemeClr val="tx1"/>
+    </cs:fontRef>
+    <cs:spPr>
+      <a:ln w="9525" cap="rnd">
+        <a:solidFill>
+          <a:schemeClr val="phClr"/>
+        </a:solidFill>
+        <a:round/>
+      </a:ln>
+    </cs:spPr>
+  </cs:dataPointWireframe>
+  <cs:dataTable>
+    <cs:lnRef idx="0"/>
+    <cs:fillRef idx="0"/>
+    <cs:effectRef idx="0"/>
+    <cs:fontRef idx="minor">
+      <a:schemeClr val="tx1">
+        <a:lumMod val="65000"/>
+        <a:lumOff val="35000"/>
+      </a:schemeClr>
+    </cs:fontRef>
+    <cs:spPr>
+      <a:noFill/>
+      <a:ln w="9525" cap="flat" cmpd="sng" algn="ctr">
+        <a:solidFill>
+          <a:schemeClr val="tx1">
+            <a:lumMod val="15000"/>
+            <a:lumOff val="85000"/>
+          </a:schemeClr>
+        </a:solidFill>
+        <a:round/>
+      </a:ln>
+    </cs:spPr>
+    <cs:defRPr sz="900" kern="1200"/>
+  </cs:dataTable>
+  <cs:downBar>
+    <cs:lnRef idx="0"/>
+    <cs:fillRef idx="0"/>
+    <cs:effectRef idx="0"/>
+    <cs:fontRef idx="minor">
+      <a:schemeClr val="dk1"/>
+    </cs:fontRef>
+    <cs:spPr>
+      <a:solidFill>
+        <a:schemeClr val="dk1">
+          <a:lumMod val="65000"/>
+          <a:lumOff val="35000"/>
+        </a:schemeClr>
+      </a:solidFill>
+      <a:ln w="9525">
+        <a:solidFill>
+          <a:schemeClr val="tx1">
+            <a:lumMod val="65000"/>
+            <a:lumOff val="35000"/>
+          </a:schemeClr>
+        </a:solidFill>
+      </a:ln>
+    </cs:spPr>
+  </cs:downBar>
+  <cs:dropLine>
+    <cs:lnRef idx="0"/>
+    <cs:fillRef idx="0"/>
+    <cs:effectRef idx="0"/>
+    <cs:fontRef idx="minor">
+      <a:schemeClr val="tx1"/>
+    </cs:fontRef>
+    <cs:spPr>
+      <a:ln w="9525" cap="flat" cmpd="sng" algn="ctr">
+        <a:solidFill>
+          <a:schemeClr val="tx1">
+            <a:lumMod val="35000"/>
+            <a:lumOff val="65000"/>
+          </a:schemeClr>
+        </a:solidFill>
+        <a:round/>
+      </a:ln>
+    </cs:spPr>
+  </cs:dropLine>
+  <cs:errorBar>
+    <cs:lnRef idx="0"/>
+    <cs:fillRef idx="0"/>
+    <cs:effectRef idx="0"/>
+    <cs:fontRef idx="minor">
+      <a:schemeClr val="tx1"/>
+    </cs:fontRef>
+    <cs:spPr>
+      <a:ln w="9525" cap="flat" cmpd="sng" algn="ctr">
+        <a:solidFill>
+          <a:schemeClr val="tx1">
+            <a:lumMod val="65000"/>
+            <a:lumOff val="35000"/>
+          </a:schemeClr>
+        </a:solidFill>
+        <a:round/>
+      </a:ln>
+    </cs:spPr>
+  </cs:errorBar>
+  <cs:floor>
+    <cs:lnRef idx="0"/>
+    <cs:fillRef idx="0"/>
+    <cs:effectRef idx="0"/>
+    <cs:fontRef idx="minor">
+      <a:schemeClr val="tx1"/>
+    </cs:fontRef>
+    <cs:spPr>
+      <a:noFill/>
+      <a:ln>
+        <a:noFill/>
+      </a:ln>
+    </cs:spPr>
+  </cs:floor>
+  <cs:gridlineMajor>
+    <cs:lnRef idx="0"/>
+    <cs:fillRef idx="0"/>
+    <cs:effectRef idx="0"/>
+    <cs:fontRef idx="minor">
+      <a:schemeClr val="tx1"/>
+    </cs:fontRef>
+    <cs:spPr>
+      <a:ln w="9525" cap="flat" cmpd="sng" algn="ctr">
+        <a:solidFill>
+          <a:schemeClr val="tx1">
+            <a:lumMod val="15000"/>
+            <a:lumOff val="85000"/>
+          </a:schemeClr>
+        </a:solidFill>
+        <a:round/>
+      </a:ln>
+    </cs:spPr>
+  </cs:gridlineMajor>
+  <cs:gridlineMinor>
+    <cs:lnRef idx="0"/>
+    <cs:fillRef idx="0"/>
+    <cs:effectRef idx="0"/>
+    <cs:fontRef idx="minor">
+      <a:schemeClr val="tx1"/>
+    </cs:fontRef>
+    <cs:spPr>
+      <a:ln w="9525" cap="flat" cmpd="sng" algn="ctr">
+        <a:solidFill>
+          <a:schemeClr val="tx1">
+            <a:lumMod val="5000"/>
+            <a:lumOff val="95000"/>
+          </a:schemeClr>
+        </a:solidFill>
+        <a:round/>
+      </a:ln>
+    </cs:spPr>
+  </cs:gridlineMinor>
+  <cs:hiLoLine>
+    <cs:lnRef idx="0"/>
+    <cs:fillRef idx="0"/>
+    <cs:effectRef idx="0"/>
+    <cs:fontRef idx="minor">
+      <a:schemeClr val="tx1"/>
+    </cs:fontRef>
+    <cs:spPr>
+      <a:ln w="9525" cap="flat" cmpd="sng" algn="ctr">
+        <a:solidFill>
+          <a:schemeClr val="tx1">
+            <a:lumMod val="75000"/>
+            <a:lumOff val="25000"/>
+          </a:schemeClr>
+        </a:solidFill>
+        <a:round/>
+      </a:ln>
+    </cs:spPr>
+  </cs:hiLoLine>
+  <cs:leaderLine>
+    <cs:lnRef idx="0"/>
+    <cs:fillRef idx="0"/>
+    <cs:effectRef idx="0"/>
+    <cs:fontRef idx="minor">
+      <a:schemeClr val="tx1"/>
+    </cs:fontRef>
+    <cs:spPr>
+      <a:ln w="9525" cap="flat" cmpd="sng" algn="ctr">
+        <a:solidFill>
+          <a:schemeClr val="tx1">
+            <a:lumMod val="35000"/>
+            <a:lumOff val="65000"/>
+          </a:schemeClr>
+        </a:solidFill>
+        <a:round/>
+      </a:ln>
+    </cs:spPr>
+  </cs:leaderLine>
+  <cs:legend>
+    <cs:lnRef idx="0"/>
+    <cs:fillRef idx="0"/>
+    <cs:effectRef idx="0"/>
+    <cs:fontRef idx="minor">
+      <a:schemeClr val="tx1">
+        <a:lumMod val="65000"/>
+        <a:lumOff val="35000"/>
+      </a:schemeClr>
+    </cs:fontRef>
+    <cs:defRPr sz="900" kern="1200"/>
+  </cs:legend>
+  <cs:plotArea mods="allowNoFillOverride allowNoLineOverride">
+    <cs:lnRef idx="0"/>
+    <cs:fillRef idx="0"/>
+    <cs:effectRef idx="0"/>
+    <cs:fontRef idx="minor">
+      <a:schemeClr val="tx1"/>
+    </cs:fontRef>
+  </cs:plotArea>
+  <cs:plotArea3D mods="allowNoFillOverride allowNoLineOverride">
+    <cs:lnRef idx="0"/>
+    <cs:fillRef idx="0"/>
+    <cs:effectRef idx="0"/>
+    <cs:fontRef idx="minor">
+      <a:schemeClr val="tx1"/>
+    </cs:fontRef>
+  </cs:plotArea3D>
+  <cs:seriesAxis>
+    <cs:lnRef idx="0"/>
+    <cs:fillRef idx="0"/>
+    <cs:effectRef idx="0"/>
+    <cs:fontRef idx="minor">
+      <a:schemeClr val="tx1">
+        <a:lumMod val="65000"/>
+        <a:lumOff val="35000"/>
+      </a:schemeClr>
+    </cs:fontRef>
+    <cs:defRPr sz="900" kern="1200"/>
+  </cs:seriesAxis>
+  <cs:seriesLine>
+    <cs:lnRef idx="0"/>
+    <cs:fillRef idx="0"/>
+    <cs:effectRef idx="0"/>
+    <cs:fontRef idx="minor">
+      <a:schemeClr val="tx1"/>
+    </cs:fontRef>
+    <cs:spPr>
+      <a:ln w="9525" cap="flat" cmpd="sng" algn="ctr">
+        <a:solidFill>
+          <a:schemeClr val="tx1">
+            <a:lumMod val="35000"/>
+            <a:lumOff val="65000"/>
+          </a:schemeClr>
+        </a:solidFill>
+        <a:round/>
+      </a:ln>
+    </cs:spPr>
+  </cs:seriesLine>
+  <cs:title>
+    <cs:lnRef idx="0"/>
+    <cs:fillRef idx="0"/>
+    <cs:effectRef idx="0"/>
+    <cs:fontRef idx="minor">
+      <a:schemeClr val="tx1">
+        <a:lumMod val="65000"/>
+        <a:lumOff val="35000"/>
+      </a:schemeClr>
+    </cs:fontRef>
+    <cs:defRPr sz="1400" b="0" kern="1200" spc="0" baseline="0"/>
+  </cs:title>
+  <cs:trendline>
+    <cs:lnRef idx="0">
+      <cs:styleClr val="auto"/>
+    </cs:lnRef>
+    <cs:fillRef idx="0"/>
+    <cs:effectRef idx="0"/>
+    <cs:fontRef idx="minor">
+      <a:schemeClr val="tx1"/>
+    </cs:fontRef>
+    <cs:spPr>
+      <a:ln w="19050" cap="rnd">
+        <a:solidFill>
+          <a:schemeClr val="phClr"/>
+        </a:solidFill>
+        <a:prstDash val="sysDot"/>
+      </a:ln>
+    </cs:spPr>
+  </cs:trendline>
+  <cs:trendlineLabel>
+    <cs:lnRef idx="0"/>
+    <cs:fillRef idx="0"/>
+    <cs:effectRef idx="0"/>
+    <cs:fontRef idx="minor">
+      <a:schemeClr val="tx1">
+        <a:lumMod val="65000"/>
+        <a:lumOff val="35000"/>
+      </a:schemeClr>
+    </cs:fontRef>
+    <cs:defRPr sz="900" kern="1200"/>
+  </cs:trendlineLabel>
+  <cs:upBar>
+    <cs:lnRef idx="0"/>
+    <cs:fillRef idx="0"/>
+    <cs:effectRef idx="0"/>
+    <cs:fontRef idx="minor">
+      <a:schemeClr val="dk1"/>
+    </cs:fontRef>
+    <cs:spPr>
+      <a:solidFill>
+        <a:schemeClr val="lt1"/>
+      </a:solidFill>
+      <a:ln w="9525">
+        <a:solidFill>
+          <a:schemeClr val="tx1">
+            <a:lumMod val="15000"/>
+            <a:lumOff val="85000"/>
+          </a:schemeClr>
+        </a:solidFill>
+      </a:ln>
+    </cs:spPr>
+  </cs:upBar>
+  <cs:valueAxis>
+    <cs:lnRef idx="0"/>
+    <cs:fillRef idx="0"/>
+    <cs:effectRef idx="0"/>
+    <cs:fontRef idx="minor">
+      <a:schemeClr val="tx1">
+        <a:lumMod val="65000"/>
+        <a:lumOff val="35000"/>
+      </a:schemeClr>
+    </cs:fontRef>
+    <cs:defRPr sz="900" kern="1200"/>
+  </cs:valueAxis>
+  <cs:wall>
+    <cs:lnRef idx="0"/>
+    <cs:fillRef idx="0"/>
+    <cs:effectRef idx="0"/>
+    <cs:fontRef idx="minor">
+      <a:schemeClr val="tx1"/>
+    </cs:fontRef>
+    <cs:spPr>
+      <a:noFill/>
+      <a:ln>
+        <a:noFill/>
+      </a:ln>
+    </cs:spPr>
+  </cs:wall>
+</cs:chartStyle>
 </file>
 
 <file path=ppt/notesMasters/notesMaster1.xml><?xml version="1.0" encoding="utf-8"?>
@@ -3547,20 +4699,37 @@
             <p:ph type="subTitle" idx="1"/>
           </p:nvPr>
         </p:nvSpPr>
-        <p:spPr/>
-        <p:txBody>
-          <a:bodyPr/>
-          <a:lstStyle/>
+        <p:spPr>
+          <a:xfrm>
+            <a:off x="1524000" y="3602038"/>
+            <a:ext cx="9144000" cy="2189162"/>
+          </a:xfrm>
+        </p:spPr>
+        <p:txBody>
+          <a:bodyPr>
+            <a:normAutofit lnSpcReduction="10000"/>
+          </a:bodyPr>
+          <a:lstStyle/>
+          <a:p>
+            <a:r>
+              <a:rPr lang="en-US" b="1" dirty="0" smtClean="0"/>
+              <a:t>Team Cookie Council</a:t>
+            </a:r>
+          </a:p>
           <a:p>
             <a:r>
               <a:rPr lang="en-US" dirty="0" smtClean="0"/>
-              <a:t>Team Cookie Council</a:t>
-            </a:r>
-          </a:p>
-          <a:p>
+              <a:t>Matt </a:t>
+            </a:r>
             <a:r>
               <a:rPr lang="en-US" dirty="0" smtClean="0"/>
-              <a:t>Matt Eck, Mike </a:t>
+              <a:t>Eck – Database Manager</a:t>
+            </a:r>
+          </a:p>
+          <a:p>
+            <a:r>
+              <a:rPr lang="en-US" dirty="0" smtClean="0"/>
+              <a:t>Mike </a:t>
             </a:r>
             <a:r>
               <a:rPr lang="en-US" dirty="0" err="1" smtClean="0"/>
@@ -3568,8 +4737,21 @@
             </a:r>
             <a:r>
               <a:rPr lang="en-US" dirty="0" smtClean="0"/>
-              <a:t>, Nathan Martz, Ryan Schroeder</a:t>
-            </a:r>
+              <a:t> – Quality Assurance</a:t>
+            </a:r>
+          </a:p>
+          <a:p>
+            <a:r>
+              <a:rPr lang="en-US" dirty="0" smtClean="0"/>
+              <a:t>Nathan Martz – Customer Proxy</a:t>
+            </a:r>
+          </a:p>
+          <a:p>
+            <a:r>
+              <a:rPr lang="en-US" dirty="0" smtClean="0"/>
+              <a:t>Ryan Schroeder – Scrum Master</a:t>
+            </a:r>
+            <a:endParaRPr lang="en-US" dirty="0" smtClean="0"/>
           </a:p>
         </p:txBody>
       </p:sp>
@@ -4085,6 +5267,135 @@
       </p:grpSpPr>
       <p:sp>
         <p:nvSpPr>
+          <p:cNvPr id="4" name="Date Placeholder 3"/>
+          <p:cNvSpPr>
+            <a:spLocks noGrp="1"/>
+          </p:cNvSpPr>
+          <p:nvPr>
+            <p:ph type="dt" sz="half" idx="10"/>
+          </p:nvPr>
+        </p:nvSpPr>
+        <p:spPr/>
+        <p:txBody>
+          <a:bodyPr/>
+          <a:lstStyle/>
+          <a:p>
+            <a:fld id="{ABF31F3C-CA9E-427B-B349-0F75E75E9268}" type="datetime1">
+              <a:rPr lang="en-US" smtClean="0"/>
+              <a:t>4/5/2016</a:t>
+            </a:fld>
+            <a:endParaRPr lang="en-US"/>
+          </a:p>
+        </p:txBody>
+      </p:sp>
+      <p:sp>
+        <p:nvSpPr>
+          <p:cNvPr id="5" name="Footer Placeholder 4"/>
+          <p:cNvSpPr>
+            <a:spLocks noGrp="1"/>
+          </p:cNvSpPr>
+          <p:nvPr>
+            <p:ph type="ftr" sz="quarter" idx="11"/>
+          </p:nvPr>
+        </p:nvSpPr>
+        <p:spPr/>
+        <p:txBody>
+          <a:bodyPr/>
+          <a:lstStyle/>
+          <a:p>
+            <a:r>
+              <a:rPr lang="en-US" dirty="0" smtClean="0"/>
+              <a:t>Nate</a:t>
+            </a:r>
+            <a:endParaRPr lang="en-US" dirty="0"/>
+          </a:p>
+        </p:txBody>
+      </p:sp>
+      <p:sp>
+        <p:nvSpPr>
+          <p:cNvPr id="6" name="Slide Number Placeholder 5"/>
+          <p:cNvSpPr>
+            <a:spLocks noGrp="1"/>
+          </p:cNvSpPr>
+          <p:nvPr>
+            <p:ph type="sldNum" sz="quarter" idx="12"/>
+          </p:nvPr>
+        </p:nvSpPr>
+        <p:spPr/>
+        <p:txBody>
+          <a:bodyPr/>
+          <a:lstStyle/>
+          <a:p>
+            <a:r>
+              <a:rPr lang="en-US" dirty="0" smtClean="0"/>
+              <a:t>12</a:t>
+            </a:r>
+            <a:endParaRPr lang="en-US" dirty="0"/>
+          </a:p>
+        </p:txBody>
+      </p:sp>
+      <p:graphicFrame>
+        <p:nvGraphicFramePr>
+          <p:cNvPr id="7" name="Chart 6">
+            <a:extLst>
+              <a:ext uri="{FF2B5EF4-FFF2-40B4-BE49-F238E27FC236}">
+                <a16:creationId xmlns:xdr="http://schemas.openxmlformats.org/drawingml/2006/spreadsheetDrawing" xmlns:a16="http://schemas.microsoft.com/office/drawing/2014/main" xmlns="" xmlns:lc="http://schemas.openxmlformats.org/drawingml/2006/lockedCanvas" id="{00000000-0008-0000-0000-000008000000}"/>
+              </a:ext>
+            </a:extLst>
+          </p:cNvPr>
+          <p:cNvGraphicFramePr>
+            <a:graphicFrameLocks/>
+          </p:cNvGraphicFramePr>
+          <p:nvPr>
+            <p:extLst>
+              <p:ext uri="{D42A27DB-BD31-4B8C-83A1-F6EECF244321}">
+                <p14:modId xmlns:p14="http://schemas.microsoft.com/office/powerpoint/2010/main" val="4045609136"/>
+              </p:ext>
+            </p:extLst>
+          </p:nvPr>
+        </p:nvGraphicFramePr>
+        <p:xfrm>
+          <a:off x="1077202" y="589422"/>
+          <a:ext cx="9748838" cy="5310188"/>
+        </p:xfrm>
+        <a:graphic>
+          <a:graphicData uri="http://schemas.openxmlformats.org/drawingml/2006/chart">
+            <c:chart xmlns:c="http://schemas.openxmlformats.org/drawingml/2006/chart" xmlns:r="http://schemas.openxmlformats.org/officeDocument/2006/relationships" r:id="rId2"/>
+          </a:graphicData>
+        </a:graphic>
+      </p:graphicFrame>
+    </p:spTree>
+    <p:extLst>
+      <p:ext uri="{BB962C8B-B14F-4D97-AF65-F5344CB8AC3E}">
+        <p14:creationId xmlns:p14="http://schemas.microsoft.com/office/powerpoint/2010/main" val="2204319524"/>
+      </p:ext>
+    </p:extLst>
+  </p:cSld>
+  <p:clrMapOvr>
+    <a:masterClrMapping/>
+  </p:clrMapOvr>
+</p:sld>
+</file>
+
+<file path=ppt/slides/slide14.xml><?xml version="1.0" encoding="utf-8"?>
+<p:sld xmlns:a="http://schemas.openxmlformats.org/drawingml/2006/main" xmlns:r="http://schemas.openxmlformats.org/officeDocument/2006/relationships" xmlns:p="http://schemas.openxmlformats.org/presentationml/2006/main">
+  <p:cSld>
+    <p:spTree>
+      <p:nvGrpSpPr>
+        <p:cNvPr id="1" name=""/>
+        <p:cNvGrpSpPr/>
+        <p:nvPr/>
+      </p:nvGrpSpPr>
+      <p:grpSpPr>
+        <a:xfrm>
+          <a:off x="0" y="0"/>
+          <a:ext cx="0" cy="0"/>
+          <a:chOff x="0" y="0"/>
+          <a:chExt cx="0" cy="0"/>
+        </a:xfrm>
+      </p:grpSpPr>
+      <p:sp>
+        <p:nvSpPr>
           <p:cNvPr id="2" name="Title 1"/>
           <p:cNvSpPr>
             <a:spLocks noGrp="1"/>
@@ -4217,7 +5528,7 @@
           <a:p>
             <a:r>
               <a:rPr lang="en-US" dirty="0" smtClean="0"/>
-              <a:t>12</a:t>
+              <a:t>13</a:t>
             </a:r>
             <a:endParaRPr lang="en-US" dirty="0"/>
           </a:p>

</xml_diff>